<commit_message>
Updated to include hotlinks over the buttons
</commit_message>
<xml_diff>
--- a/Reunions App.pptx
+++ b/Reunions App.pptx
@@ -109,6 +109,11 @@
       </a:defRPr>
     </a:lvl9pPr>
   </p:defaultTextStyle>
+  <p:extLst>
+    <p:ext uri="{EFAFB233-063F-42B5-8137-9DF3F51BA10A}">
+      <p15:sldGuideLst xmlns:p15="http://schemas.microsoft.com/office/powerpoint/2012/main"/>
+    </p:ext>
+  </p:extLst>
 </p:presentation>
 </file>
 
@@ -162,7 +167,7 @@
           <a:noFill/>
           <a:extLst>
             <a:ext uri="{909E8E84-426E-40dd-AFC4-6F175D3DCCD1}">
-              <a14:hiddenFill xmlns:a14="http://schemas.microsoft.com/office/drawing/2010/main" xmlns="">
+              <a14:hiddenFill xmlns="" xmlns:a14="http://schemas.microsoft.com/office/drawing/2010/main">
                 <a:solidFill>
                   <a:srgbClr val="FFFFFF"/>
                 </a:solidFill>
@@ -222,7 +227,7 @@
             </a:ln>
             <a:extLst>
               <a:ext uri="{91240B29-F687-4f45-9708-019B960494DF}">
-                <a14:hiddenLine xmlns:a14="http://schemas.microsoft.com/office/drawing/2010/main" xmlns="" w="9525">
+                <a14:hiddenLine xmlns="" xmlns:a14="http://schemas.microsoft.com/office/drawing/2010/main" w="9525">
                   <a:solidFill>
                     <a:srgbClr val="000000"/>
                   </a:solidFill>
@@ -312,7 +317,7 @@
             </a:ln>
             <a:extLst>
               <a:ext uri="{91240B29-F687-4f45-9708-019B960494DF}">
-                <a14:hiddenLine xmlns:a14="http://schemas.microsoft.com/office/drawing/2010/main" xmlns="" w="9525">
+                <a14:hiddenLine xmlns="" xmlns:a14="http://schemas.microsoft.com/office/drawing/2010/main" w="9525">
                   <a:solidFill>
                     <a:srgbClr val="000000"/>
                   </a:solidFill>
@@ -402,7 +407,7 @@
             </a:ln>
             <a:extLst>
               <a:ext uri="{91240B29-F687-4f45-9708-019B960494DF}">
-                <a14:hiddenLine xmlns:a14="http://schemas.microsoft.com/office/drawing/2010/main" xmlns="" w="9525">
+                <a14:hiddenLine xmlns="" xmlns:a14="http://schemas.microsoft.com/office/drawing/2010/main" w="9525">
                   <a:solidFill>
                     <a:srgbClr val="000000"/>
                   </a:solidFill>
@@ -436,7 +441,7 @@
             </a:ln>
             <a:extLst>
               <a:ext uri="{91240B29-F687-4f45-9708-019B960494DF}">
-                <a14:hiddenLine xmlns:a14="http://schemas.microsoft.com/office/drawing/2010/main" xmlns="" w="9525">
+                <a14:hiddenLine xmlns="" xmlns:a14="http://schemas.microsoft.com/office/drawing/2010/main" w="9525">
                   <a:solidFill>
                     <a:srgbClr val="000000"/>
                   </a:solidFill>
@@ -526,7 +531,7 @@
             </a:ln>
             <a:extLst>
               <a:ext uri="{91240B29-F687-4f45-9708-019B960494DF}">
-                <a14:hiddenLine xmlns:a14="http://schemas.microsoft.com/office/drawing/2010/main" xmlns="" w="9525">
+                <a14:hiddenLine xmlns="" xmlns:a14="http://schemas.microsoft.com/office/drawing/2010/main" w="9525">
                   <a:solidFill>
                     <a:srgbClr val="000000"/>
                   </a:solidFill>
@@ -588,7 +593,7 @@
             </a:ln>
             <a:extLst>
               <a:ext uri="{91240B29-F687-4f45-9708-019B960494DF}">
-                <a14:hiddenLine xmlns:a14="http://schemas.microsoft.com/office/drawing/2010/main" xmlns="" w="9525">
+                <a14:hiddenLine xmlns="" xmlns:a14="http://schemas.microsoft.com/office/drawing/2010/main" w="9525">
                   <a:solidFill>
                     <a:srgbClr val="000000"/>
                   </a:solidFill>
@@ -650,7 +655,7 @@
             </a:ln>
             <a:extLst>
               <a:ext uri="{91240B29-F687-4f45-9708-019B960494DF}">
-                <a14:hiddenLine xmlns:a14="http://schemas.microsoft.com/office/drawing/2010/main" xmlns="" w="9525">
+                <a14:hiddenLine xmlns="" xmlns:a14="http://schemas.microsoft.com/office/drawing/2010/main" w="9525">
                   <a:solidFill>
                     <a:srgbClr val="000000"/>
                   </a:solidFill>
@@ -740,7 +745,7 @@
             </a:ln>
             <a:extLst>
               <a:ext uri="{91240B29-F687-4f45-9708-019B960494DF}">
-                <a14:hiddenLine xmlns:a14="http://schemas.microsoft.com/office/drawing/2010/main" xmlns="" w="9525">
+                <a14:hiddenLine xmlns="" xmlns:a14="http://schemas.microsoft.com/office/drawing/2010/main" w="9525">
                   <a:solidFill>
                     <a:srgbClr val="000000"/>
                   </a:solidFill>
@@ -802,7 +807,7 @@
             </a:ln>
             <a:extLst>
               <a:ext uri="{91240B29-F687-4f45-9708-019B960494DF}">
-                <a14:hiddenLine xmlns:a14="http://schemas.microsoft.com/office/drawing/2010/main" xmlns="" w="9525">
+                <a14:hiddenLine xmlns="" xmlns:a14="http://schemas.microsoft.com/office/drawing/2010/main" w="9525">
                   <a:solidFill>
                     <a:srgbClr val="000000"/>
                   </a:solidFill>
@@ -864,7 +869,7 @@
             </a:ln>
             <a:extLst>
               <a:ext uri="{91240B29-F687-4f45-9708-019B960494DF}">
-                <a14:hiddenLine xmlns:a14="http://schemas.microsoft.com/office/drawing/2010/main" xmlns="" w="9525">
+                <a14:hiddenLine xmlns="" xmlns:a14="http://schemas.microsoft.com/office/drawing/2010/main" w="9525">
                   <a:solidFill>
                     <a:srgbClr val="000000"/>
                   </a:solidFill>
@@ -954,7 +959,7 @@
             </a:ln>
             <a:extLst>
               <a:ext uri="{91240B29-F687-4f45-9708-019B960494DF}">
-                <a14:hiddenLine xmlns:a14="http://schemas.microsoft.com/office/drawing/2010/main" xmlns="" w="9525">
+                <a14:hiddenLine xmlns="" xmlns:a14="http://schemas.microsoft.com/office/drawing/2010/main" w="9525">
                   <a:solidFill>
                     <a:srgbClr val="000000"/>
                   </a:solidFill>
@@ -1044,7 +1049,7 @@
             </a:ln>
             <a:extLst>
               <a:ext uri="{91240B29-F687-4f45-9708-019B960494DF}">
-                <a14:hiddenLine xmlns:a14="http://schemas.microsoft.com/office/drawing/2010/main" xmlns="" w="9525">
+                <a14:hiddenLine xmlns="" xmlns:a14="http://schemas.microsoft.com/office/drawing/2010/main" w="9525">
                   <a:solidFill>
                     <a:srgbClr val="000000"/>
                   </a:solidFill>
@@ -1106,7 +1111,7 @@
             </a:ln>
             <a:extLst>
               <a:ext uri="{91240B29-F687-4f45-9708-019B960494DF}">
-                <a14:hiddenLine xmlns:a14="http://schemas.microsoft.com/office/drawing/2010/main" xmlns="" w="9525">
+                <a14:hiddenLine xmlns="" xmlns:a14="http://schemas.microsoft.com/office/drawing/2010/main" w="9525">
                   <a:solidFill>
                     <a:srgbClr val="000000"/>
                   </a:solidFill>
@@ -1216,7 +1221,7 @@
             </a:ln>
             <a:extLst>
               <a:ext uri="{91240B29-F687-4f45-9708-019B960494DF}">
-                <a14:hiddenLine xmlns:a14="http://schemas.microsoft.com/office/drawing/2010/main" xmlns="" w="9525">
+                <a14:hiddenLine xmlns="" xmlns:a14="http://schemas.microsoft.com/office/drawing/2010/main" w="9525">
                   <a:solidFill>
                     <a:srgbClr val="000000"/>
                   </a:solidFill>
@@ -1278,7 +1283,7 @@
             </a:ln>
             <a:extLst>
               <a:ext uri="{91240B29-F687-4f45-9708-019B960494DF}">
-                <a14:hiddenLine xmlns:a14="http://schemas.microsoft.com/office/drawing/2010/main" xmlns="" w="9525">
+                <a14:hiddenLine xmlns="" xmlns:a14="http://schemas.microsoft.com/office/drawing/2010/main" w="9525">
                   <a:solidFill>
                     <a:srgbClr val="000000"/>
                   </a:solidFill>
@@ -1368,7 +1373,7 @@
             </a:ln>
             <a:extLst>
               <a:ext uri="{91240B29-F687-4f45-9708-019B960494DF}">
-                <a14:hiddenLine xmlns:a14="http://schemas.microsoft.com/office/drawing/2010/main" xmlns="" w="9525">
+                <a14:hiddenLine xmlns="" xmlns:a14="http://schemas.microsoft.com/office/drawing/2010/main" w="9525">
                   <a:solidFill>
                     <a:srgbClr val="000000"/>
                   </a:solidFill>
@@ -1458,7 +1463,7 @@
             </a:ln>
             <a:extLst>
               <a:ext uri="{91240B29-F687-4f45-9708-019B960494DF}">
-                <a14:hiddenLine xmlns:a14="http://schemas.microsoft.com/office/drawing/2010/main" xmlns="" w="9525">
+                <a14:hiddenLine xmlns="" xmlns:a14="http://schemas.microsoft.com/office/drawing/2010/main" w="9525">
                   <a:solidFill>
                     <a:srgbClr val="000000"/>
                   </a:solidFill>
@@ -1520,7 +1525,7 @@
             </a:ln>
             <a:extLst>
               <a:ext uri="{91240B29-F687-4f45-9708-019B960494DF}">
-                <a14:hiddenLine xmlns:a14="http://schemas.microsoft.com/office/drawing/2010/main" xmlns="" w="9525">
+                <a14:hiddenLine xmlns="" xmlns:a14="http://schemas.microsoft.com/office/drawing/2010/main" w="9525">
                   <a:solidFill>
                     <a:srgbClr val="000000"/>
                   </a:solidFill>
@@ -1610,7 +1615,7 @@
             </a:ln>
             <a:extLst>
               <a:ext uri="{91240B29-F687-4f45-9708-019B960494DF}">
-                <a14:hiddenLine xmlns:a14="http://schemas.microsoft.com/office/drawing/2010/main" xmlns="" w="9525">
+                <a14:hiddenLine xmlns="" xmlns:a14="http://schemas.microsoft.com/office/drawing/2010/main" w="9525">
                   <a:solidFill>
                     <a:srgbClr val="000000"/>
                   </a:solidFill>
@@ -1700,7 +1705,7 @@
             </a:ln>
             <a:extLst>
               <a:ext uri="{91240B29-F687-4f45-9708-019B960494DF}">
-                <a14:hiddenLine xmlns:a14="http://schemas.microsoft.com/office/drawing/2010/main" xmlns="" w="9525">
+                <a14:hiddenLine xmlns="" xmlns:a14="http://schemas.microsoft.com/office/drawing/2010/main" w="9525">
                   <a:solidFill>
                     <a:srgbClr val="000000"/>
                   </a:solidFill>
@@ -1756,7 +1761,7 @@
             </a:ln>
             <a:extLst>
               <a:ext uri="{91240B29-F687-4f45-9708-019B960494DF}">
-                <a14:hiddenLine xmlns:a14="http://schemas.microsoft.com/office/drawing/2010/main" xmlns="" w="9525">
+                <a14:hiddenLine xmlns="" xmlns:a14="http://schemas.microsoft.com/office/drawing/2010/main" w="9525">
                   <a:solidFill>
                     <a:srgbClr val="000000"/>
                   </a:solidFill>
@@ -1846,7 +1851,7 @@
             </a:ln>
             <a:extLst>
               <a:ext uri="{91240B29-F687-4f45-9708-019B960494DF}">
-                <a14:hiddenLine xmlns:a14="http://schemas.microsoft.com/office/drawing/2010/main" xmlns="" w="9525">
+                <a14:hiddenLine xmlns="" xmlns:a14="http://schemas.microsoft.com/office/drawing/2010/main" w="9525">
                   <a:solidFill>
                     <a:srgbClr val="000000"/>
                   </a:solidFill>
@@ -1902,7 +1907,7 @@
             </a:ln>
             <a:extLst>
               <a:ext uri="{91240B29-F687-4f45-9708-019B960494DF}">
-                <a14:hiddenLine xmlns:a14="http://schemas.microsoft.com/office/drawing/2010/main" xmlns="" w="9525">
+                <a14:hiddenLine xmlns="" xmlns:a14="http://schemas.microsoft.com/office/drawing/2010/main" w="9525">
                   <a:solidFill>
                     <a:srgbClr val="000000"/>
                   </a:solidFill>
@@ -1992,7 +1997,7 @@
             </a:ln>
             <a:extLst>
               <a:ext uri="{91240B29-F687-4f45-9708-019B960494DF}">
-                <a14:hiddenLine xmlns:a14="http://schemas.microsoft.com/office/drawing/2010/main" xmlns="" w="9525">
+                <a14:hiddenLine xmlns="" xmlns:a14="http://schemas.microsoft.com/office/drawing/2010/main" w="9525">
                   <a:solidFill>
                     <a:srgbClr val="000000"/>
                   </a:solidFill>
@@ -2060,7 +2065,7 @@
             </a:ln>
             <a:extLst>
               <a:ext uri="{91240B29-F687-4f45-9708-019B960494DF}">
-                <a14:hiddenLine xmlns:a14="http://schemas.microsoft.com/office/drawing/2010/main" xmlns="" w="9525">
+                <a14:hiddenLine xmlns="" xmlns:a14="http://schemas.microsoft.com/office/drawing/2010/main" w="9525">
                   <a:solidFill>
                     <a:srgbClr val="000000"/>
                   </a:solidFill>
@@ -2150,7 +2155,7 @@
             </a:ln>
             <a:extLst>
               <a:ext uri="{91240B29-F687-4f45-9708-019B960494DF}">
-                <a14:hiddenLine xmlns:a14="http://schemas.microsoft.com/office/drawing/2010/main" xmlns="" w="9525">
+                <a14:hiddenLine xmlns="" xmlns:a14="http://schemas.microsoft.com/office/drawing/2010/main" w="9525">
                   <a:solidFill>
                     <a:srgbClr val="000000"/>
                   </a:solidFill>
@@ -2218,7 +2223,7 @@
             </a:ln>
             <a:extLst>
               <a:ext uri="{91240B29-F687-4f45-9708-019B960494DF}">
-                <a14:hiddenLine xmlns:a14="http://schemas.microsoft.com/office/drawing/2010/main" xmlns="" w="9525">
+                <a14:hiddenLine xmlns="" xmlns:a14="http://schemas.microsoft.com/office/drawing/2010/main" w="9525">
                   <a:solidFill>
                     <a:srgbClr val="000000"/>
                   </a:solidFill>
@@ -2308,7 +2313,7 @@
             </a:ln>
             <a:extLst>
               <a:ext uri="{91240B29-F687-4f45-9708-019B960494DF}">
-                <a14:hiddenLine xmlns:a14="http://schemas.microsoft.com/office/drawing/2010/main" xmlns="" w="9525">
+                <a14:hiddenLine xmlns="" xmlns:a14="http://schemas.microsoft.com/office/drawing/2010/main" w="9525">
                   <a:solidFill>
                     <a:srgbClr val="000000"/>
                   </a:solidFill>
@@ -2342,7 +2347,7 @@
             </a:ln>
             <a:extLst>
               <a:ext uri="{91240B29-F687-4f45-9708-019B960494DF}">
-                <a14:hiddenLine xmlns:a14="http://schemas.microsoft.com/office/drawing/2010/main" xmlns="" w="9525">
+                <a14:hiddenLine xmlns="" xmlns:a14="http://schemas.microsoft.com/office/drawing/2010/main" w="9525">
                   <a:solidFill>
                     <a:srgbClr val="000000"/>
                   </a:solidFill>
@@ -2432,7 +2437,7 @@
             </a:ln>
             <a:extLst>
               <a:ext uri="{91240B29-F687-4f45-9708-019B960494DF}">
-                <a14:hiddenLine xmlns:a14="http://schemas.microsoft.com/office/drawing/2010/main" xmlns="" w="9525">
+                <a14:hiddenLine xmlns="" xmlns:a14="http://schemas.microsoft.com/office/drawing/2010/main" w="9525">
                   <a:solidFill>
                     <a:srgbClr val="000000"/>
                   </a:solidFill>
@@ -2494,7 +2499,7 @@
             </a:ln>
             <a:extLst>
               <a:ext uri="{91240B29-F687-4f45-9708-019B960494DF}">
-                <a14:hiddenLine xmlns:a14="http://schemas.microsoft.com/office/drawing/2010/main" xmlns="" w="9525">
+                <a14:hiddenLine xmlns="" xmlns:a14="http://schemas.microsoft.com/office/drawing/2010/main" w="9525">
                   <a:solidFill>
                     <a:srgbClr val="000000"/>
                   </a:solidFill>
@@ -2556,7 +2561,7 @@
             </a:ln>
             <a:extLst>
               <a:ext uri="{91240B29-F687-4f45-9708-019B960494DF}">
-                <a14:hiddenLine xmlns:a14="http://schemas.microsoft.com/office/drawing/2010/main" xmlns="" w="9525">
+                <a14:hiddenLine xmlns="" xmlns:a14="http://schemas.microsoft.com/office/drawing/2010/main" w="9525">
                   <a:solidFill>
                     <a:srgbClr val="000000"/>
                   </a:solidFill>
@@ -2646,7 +2651,7 @@
             </a:ln>
             <a:extLst>
               <a:ext uri="{91240B29-F687-4f45-9708-019B960494DF}">
-                <a14:hiddenLine xmlns:a14="http://schemas.microsoft.com/office/drawing/2010/main" xmlns="" w="9525">
+                <a14:hiddenLine xmlns="" xmlns:a14="http://schemas.microsoft.com/office/drawing/2010/main" w="9525">
                   <a:solidFill>
                     <a:srgbClr val="000000"/>
                   </a:solidFill>
@@ -2714,7 +2719,7 @@
             </a:ln>
             <a:extLst>
               <a:ext uri="{91240B29-F687-4f45-9708-019B960494DF}">
-                <a14:hiddenLine xmlns:a14="http://schemas.microsoft.com/office/drawing/2010/main" xmlns="" w="9525">
+                <a14:hiddenLine xmlns="" xmlns:a14="http://schemas.microsoft.com/office/drawing/2010/main" w="9525">
                   <a:solidFill>
                     <a:srgbClr val="000000"/>
                   </a:solidFill>
@@ -2776,7 +2781,7 @@
             </a:ln>
             <a:extLst>
               <a:ext uri="{91240B29-F687-4f45-9708-019B960494DF}">
-                <a14:hiddenLine xmlns:a14="http://schemas.microsoft.com/office/drawing/2010/main" xmlns="" w="9525">
+                <a14:hiddenLine xmlns="" xmlns:a14="http://schemas.microsoft.com/office/drawing/2010/main" w="9525">
                   <a:solidFill>
                     <a:srgbClr val="000000"/>
                   </a:solidFill>
@@ -2866,7 +2871,7 @@
             </a:ln>
             <a:extLst>
               <a:ext uri="{91240B29-F687-4f45-9708-019B960494DF}">
-                <a14:hiddenLine xmlns:a14="http://schemas.microsoft.com/office/drawing/2010/main" xmlns="" w="9525">
+                <a14:hiddenLine xmlns="" xmlns:a14="http://schemas.microsoft.com/office/drawing/2010/main" w="9525">
                   <a:solidFill>
                     <a:srgbClr val="000000"/>
                   </a:solidFill>
@@ -2928,7 +2933,7 @@
             </a:ln>
             <a:extLst>
               <a:ext uri="{91240B29-F687-4f45-9708-019B960494DF}">
-                <a14:hiddenLine xmlns:a14="http://schemas.microsoft.com/office/drawing/2010/main" xmlns="" w="9525">
+                <a14:hiddenLine xmlns="" xmlns:a14="http://schemas.microsoft.com/office/drawing/2010/main" w="9525">
                   <a:solidFill>
                     <a:srgbClr val="000000"/>
                   </a:solidFill>
@@ -3018,7 +3023,7 @@
             </a:ln>
             <a:extLst>
               <a:ext uri="{91240B29-F687-4f45-9708-019B960494DF}">
-                <a14:hiddenLine xmlns:a14="http://schemas.microsoft.com/office/drawing/2010/main" xmlns="" w="9525">
+                <a14:hiddenLine xmlns="" xmlns:a14="http://schemas.microsoft.com/office/drawing/2010/main" w="9525">
                   <a:solidFill>
                     <a:srgbClr val="000000"/>
                   </a:solidFill>
@@ -3080,7 +3085,7 @@
             </a:ln>
             <a:extLst>
               <a:ext uri="{91240B29-F687-4f45-9708-019B960494DF}">
-                <a14:hiddenLine xmlns:a14="http://schemas.microsoft.com/office/drawing/2010/main" xmlns="" w="9525">
+                <a14:hiddenLine xmlns="" xmlns:a14="http://schemas.microsoft.com/office/drawing/2010/main" w="9525">
                   <a:solidFill>
                     <a:srgbClr val="000000"/>
                   </a:solidFill>
@@ -3170,7 +3175,7 @@
             </a:ln>
             <a:extLst>
               <a:ext uri="{91240B29-F687-4f45-9708-019B960494DF}">
-                <a14:hiddenLine xmlns:a14="http://schemas.microsoft.com/office/drawing/2010/main" xmlns="" w="9525">
+                <a14:hiddenLine xmlns="" xmlns:a14="http://schemas.microsoft.com/office/drawing/2010/main" w="9525">
                   <a:solidFill>
                     <a:srgbClr val="000000"/>
                   </a:solidFill>
@@ -3204,7 +3209,7 @@
             </a:ln>
             <a:extLst>
               <a:ext uri="{91240B29-F687-4f45-9708-019B960494DF}">
-                <a14:hiddenLine xmlns:a14="http://schemas.microsoft.com/office/drawing/2010/main" xmlns="" w="9525">
+                <a14:hiddenLine xmlns="" xmlns:a14="http://schemas.microsoft.com/office/drawing/2010/main" w="9525">
                   <a:solidFill>
                     <a:srgbClr val="000000"/>
                   </a:solidFill>
@@ -3269,7 +3274,7 @@
             </a:ln>
             <a:extLst>
               <a:ext uri="{91240B29-F687-4f45-9708-019B960494DF}">
-                <a14:hiddenLine xmlns:a14="http://schemas.microsoft.com/office/drawing/2010/main" xmlns="" w="9525">
+                <a14:hiddenLine xmlns="" xmlns:a14="http://schemas.microsoft.com/office/drawing/2010/main" w="9525">
                   <a:solidFill>
                     <a:srgbClr val="000000"/>
                   </a:solidFill>
@@ -3359,7 +3364,7 @@
             </a:ln>
             <a:extLst>
               <a:ext uri="{91240B29-F687-4f45-9708-019B960494DF}">
-                <a14:hiddenLine xmlns:a14="http://schemas.microsoft.com/office/drawing/2010/main" xmlns="" w="9525">
+                <a14:hiddenLine xmlns="" xmlns:a14="http://schemas.microsoft.com/office/drawing/2010/main" w="9525">
                   <a:solidFill>
                     <a:srgbClr val="000000"/>
                   </a:solidFill>
@@ -3421,7 +3426,7 @@
             </a:ln>
             <a:extLst>
               <a:ext uri="{91240B29-F687-4f45-9708-019B960494DF}">
-                <a14:hiddenLine xmlns:a14="http://schemas.microsoft.com/office/drawing/2010/main" xmlns="" w="9525">
+                <a14:hiddenLine xmlns="" xmlns:a14="http://schemas.microsoft.com/office/drawing/2010/main" w="9525">
                   <a:solidFill>
                     <a:srgbClr val="000000"/>
                   </a:solidFill>
@@ -3511,7 +3516,7 @@
             </a:ln>
             <a:extLst>
               <a:ext uri="{91240B29-F687-4f45-9708-019B960494DF}">
-                <a14:hiddenLine xmlns:a14="http://schemas.microsoft.com/office/drawing/2010/main" xmlns="" w="9525">
+                <a14:hiddenLine xmlns="" xmlns:a14="http://schemas.microsoft.com/office/drawing/2010/main" w="9525">
                   <a:solidFill>
                     <a:srgbClr val="000000"/>
                   </a:solidFill>
@@ -3601,7 +3606,7 @@
             </a:ln>
             <a:extLst>
               <a:ext uri="{91240B29-F687-4f45-9708-019B960494DF}">
-                <a14:hiddenLine xmlns:a14="http://schemas.microsoft.com/office/drawing/2010/main" xmlns="" w="9525">
+                <a14:hiddenLine xmlns="" xmlns:a14="http://schemas.microsoft.com/office/drawing/2010/main" w="9525">
                   <a:solidFill>
                     <a:srgbClr val="000000"/>
                   </a:solidFill>
@@ -3666,7 +3671,7 @@
             </a:ln>
             <a:extLst>
               <a:ext uri="{91240B29-F687-4f45-9708-019B960494DF}">
-                <a14:hiddenLine xmlns:a14="http://schemas.microsoft.com/office/drawing/2010/main" xmlns="" w="9525">
+                <a14:hiddenLine xmlns="" xmlns:a14="http://schemas.microsoft.com/office/drawing/2010/main" w="9525">
                   <a:solidFill>
                     <a:srgbClr val="000000"/>
                   </a:solidFill>
@@ -3728,7 +3733,7 @@
             </a:ln>
             <a:extLst>
               <a:ext uri="{91240B29-F687-4f45-9708-019B960494DF}">
-                <a14:hiddenLine xmlns:a14="http://schemas.microsoft.com/office/drawing/2010/main" xmlns="" w="9525">
+                <a14:hiddenLine xmlns="" xmlns:a14="http://schemas.microsoft.com/office/drawing/2010/main" w="9525">
                   <a:solidFill>
                     <a:srgbClr val="000000"/>
                   </a:solidFill>
@@ -3818,7 +3823,7 @@
             </a:ln>
             <a:extLst>
               <a:ext uri="{91240B29-F687-4f45-9708-019B960494DF}">
-                <a14:hiddenLine xmlns:a14="http://schemas.microsoft.com/office/drawing/2010/main" xmlns="" w="9525">
+                <a14:hiddenLine xmlns="" xmlns:a14="http://schemas.microsoft.com/office/drawing/2010/main" w="9525">
                   <a:solidFill>
                     <a:srgbClr val="000000"/>
                   </a:solidFill>
@@ -3908,7 +3913,7 @@
             </a:ln>
             <a:extLst>
               <a:ext uri="{91240B29-F687-4f45-9708-019B960494DF}">
-                <a14:hiddenLine xmlns:a14="http://schemas.microsoft.com/office/drawing/2010/main" xmlns="" w="9525">
+                <a14:hiddenLine xmlns="" xmlns:a14="http://schemas.microsoft.com/office/drawing/2010/main" w="9525">
                   <a:solidFill>
                     <a:srgbClr val="000000"/>
                   </a:solidFill>
@@ -3970,7 +3975,7 @@
             </a:ln>
             <a:extLst>
               <a:ext uri="{91240B29-F687-4f45-9708-019B960494DF}">
-                <a14:hiddenLine xmlns:a14="http://schemas.microsoft.com/office/drawing/2010/main" xmlns="" w="9525">
+                <a14:hiddenLine xmlns="" xmlns:a14="http://schemas.microsoft.com/office/drawing/2010/main" w="9525">
                   <a:solidFill>
                     <a:srgbClr val="000000"/>
                   </a:solidFill>
@@ -4090,7 +4095,7 @@
             </a:ln>
             <a:extLst>
               <a:ext uri="{91240B29-F687-4f45-9708-019B960494DF}">
-                <a14:hiddenLine xmlns:a14="http://schemas.microsoft.com/office/drawing/2010/main" xmlns="" w="9525">
+                <a14:hiddenLine xmlns="" xmlns:a14="http://schemas.microsoft.com/office/drawing/2010/main" w="9525">
                   <a:solidFill>
                     <a:srgbClr val="000000"/>
                   </a:solidFill>
@@ -4158,7 +4163,7 @@
             </a:ln>
             <a:extLst>
               <a:ext uri="{91240B29-F687-4f45-9708-019B960494DF}">
-                <a14:hiddenLine xmlns:a14="http://schemas.microsoft.com/office/drawing/2010/main" xmlns="" w="9525">
+                <a14:hiddenLine xmlns="" xmlns:a14="http://schemas.microsoft.com/office/drawing/2010/main" w="9525">
                   <a:solidFill>
                     <a:srgbClr val="000000"/>
                   </a:solidFill>
@@ -4248,7 +4253,7 @@
             </a:ln>
             <a:extLst>
               <a:ext uri="{91240B29-F687-4f45-9708-019B960494DF}">
-                <a14:hiddenLine xmlns:a14="http://schemas.microsoft.com/office/drawing/2010/main" xmlns="" w="9525">
+                <a14:hiddenLine xmlns="" xmlns:a14="http://schemas.microsoft.com/office/drawing/2010/main" w="9525">
                   <a:solidFill>
                     <a:srgbClr val="000000"/>
                   </a:solidFill>
@@ -8970,7 +8975,7 @@
           <a:noFill/>
           <a:extLst>
             <a:ext uri="{909E8E84-426E-40dd-AFC4-6F175D3DCCD1}">
-              <a14:hiddenFill xmlns:a14="http://schemas.microsoft.com/office/drawing/2010/main" xmlns="">
+              <a14:hiddenFill xmlns="" xmlns:a14="http://schemas.microsoft.com/office/drawing/2010/main">
                 <a:solidFill>
                   <a:srgbClr val="FFFFFF"/>
                 </a:solidFill>
@@ -9044,7 +9049,7 @@
               </a:ln>
               <a:extLst>
                 <a:ext uri="{91240B29-F687-4f45-9708-019B960494DF}">
-                  <a14:hiddenLine xmlns:a14="http://schemas.microsoft.com/office/drawing/2010/main" xmlns="" w="9525">
+                  <a14:hiddenLine xmlns="" xmlns:a14="http://schemas.microsoft.com/office/drawing/2010/main" w="9525">
                     <a:solidFill>
                       <a:srgbClr val="000000"/>
                     </a:solidFill>
@@ -9134,7 +9139,7 @@
               </a:ln>
               <a:extLst>
                 <a:ext uri="{91240B29-F687-4f45-9708-019B960494DF}">
-                  <a14:hiddenLine xmlns:a14="http://schemas.microsoft.com/office/drawing/2010/main" xmlns="" w="9525">
+                  <a14:hiddenLine xmlns="" xmlns:a14="http://schemas.microsoft.com/office/drawing/2010/main" w="9525">
                     <a:solidFill>
                       <a:srgbClr val="000000"/>
                     </a:solidFill>
@@ -9224,7 +9229,7 @@
               </a:ln>
               <a:extLst>
                 <a:ext uri="{91240B29-F687-4f45-9708-019B960494DF}">
-                  <a14:hiddenLine xmlns:a14="http://schemas.microsoft.com/office/drawing/2010/main" xmlns="" w="9525">
+                  <a14:hiddenLine xmlns="" xmlns:a14="http://schemas.microsoft.com/office/drawing/2010/main" w="9525">
                     <a:solidFill>
                       <a:srgbClr val="000000"/>
                     </a:solidFill>
@@ -9286,7 +9291,7 @@
               </a:ln>
               <a:extLst>
                 <a:ext uri="{91240B29-F687-4f45-9708-019B960494DF}">
-                  <a14:hiddenLine xmlns:a14="http://schemas.microsoft.com/office/drawing/2010/main" xmlns="" w="9525">
+                  <a14:hiddenLine xmlns="" xmlns:a14="http://schemas.microsoft.com/office/drawing/2010/main" w="9525">
                     <a:solidFill>
                       <a:srgbClr val="000000"/>
                     </a:solidFill>
@@ -9376,7 +9381,7 @@
               </a:ln>
               <a:extLst>
                 <a:ext uri="{91240B29-F687-4f45-9708-019B960494DF}">
-                  <a14:hiddenLine xmlns:a14="http://schemas.microsoft.com/office/drawing/2010/main" xmlns="" w="9525">
+                  <a14:hiddenLine xmlns="" xmlns:a14="http://schemas.microsoft.com/office/drawing/2010/main" w="9525">
                     <a:solidFill>
                       <a:srgbClr val="000000"/>
                     </a:solidFill>
@@ -9438,7 +9443,7 @@
               </a:ln>
               <a:extLst>
                 <a:ext uri="{91240B29-F687-4f45-9708-019B960494DF}">
-                  <a14:hiddenLine xmlns:a14="http://schemas.microsoft.com/office/drawing/2010/main" xmlns="" w="9525">
+                  <a14:hiddenLine xmlns="" xmlns:a14="http://schemas.microsoft.com/office/drawing/2010/main" w="9525">
                     <a:solidFill>
                       <a:srgbClr val="000000"/>
                     </a:solidFill>
@@ -9500,7 +9505,7 @@
               </a:ln>
               <a:extLst>
                 <a:ext uri="{91240B29-F687-4f45-9708-019B960494DF}">
-                  <a14:hiddenLine xmlns:a14="http://schemas.microsoft.com/office/drawing/2010/main" xmlns="" w="9525">
+                  <a14:hiddenLine xmlns="" xmlns:a14="http://schemas.microsoft.com/office/drawing/2010/main" w="9525">
                     <a:solidFill>
                       <a:srgbClr val="000000"/>
                     </a:solidFill>
@@ -9590,7 +9595,7 @@
               </a:ln>
               <a:extLst>
                 <a:ext uri="{91240B29-F687-4f45-9708-019B960494DF}">
-                  <a14:hiddenLine xmlns:a14="http://schemas.microsoft.com/office/drawing/2010/main" xmlns="" w="9525">
+                  <a14:hiddenLine xmlns="" xmlns:a14="http://schemas.microsoft.com/office/drawing/2010/main" w="9525">
                     <a:solidFill>
                       <a:srgbClr val="000000"/>
                     </a:solidFill>
@@ -9680,7 +9685,7 @@
               </a:ln>
               <a:extLst>
                 <a:ext uri="{91240B29-F687-4f45-9708-019B960494DF}">
-                  <a14:hiddenLine xmlns:a14="http://schemas.microsoft.com/office/drawing/2010/main" xmlns="" w="9525">
+                  <a14:hiddenLine xmlns="" xmlns:a14="http://schemas.microsoft.com/office/drawing/2010/main" w="9525">
                     <a:solidFill>
                       <a:srgbClr val="000000"/>
                     </a:solidFill>
@@ -9742,7 +9747,7 @@
               </a:ln>
               <a:extLst>
                 <a:ext uri="{91240B29-F687-4f45-9708-019B960494DF}">
-                  <a14:hiddenLine xmlns:a14="http://schemas.microsoft.com/office/drawing/2010/main" xmlns="" w="9525">
+                  <a14:hiddenLine xmlns="" xmlns:a14="http://schemas.microsoft.com/office/drawing/2010/main" w="9525">
                     <a:solidFill>
                       <a:srgbClr val="000000"/>
                     </a:solidFill>
@@ -9852,7 +9857,7 @@
               </a:ln>
               <a:extLst>
                 <a:ext uri="{91240B29-F687-4f45-9708-019B960494DF}">
-                  <a14:hiddenLine xmlns:a14="http://schemas.microsoft.com/office/drawing/2010/main" xmlns="" w="9525">
+                  <a14:hiddenLine xmlns="" xmlns:a14="http://schemas.microsoft.com/office/drawing/2010/main" w="9525">
                     <a:solidFill>
                       <a:srgbClr val="000000"/>
                     </a:solidFill>
@@ -9936,7 +9941,7 @@
               </a:ln>
               <a:extLst>
                 <a:ext uri="{91240B29-F687-4f45-9708-019B960494DF}">
-                  <a14:hiddenLine xmlns:a14="http://schemas.microsoft.com/office/drawing/2010/main" xmlns="" w="9525">
+                  <a14:hiddenLine xmlns="" xmlns:a14="http://schemas.microsoft.com/office/drawing/2010/main" w="9525">
                     <a:solidFill>
                       <a:srgbClr val="000000"/>
                     </a:solidFill>
@@ -9998,7 +10003,7 @@
               </a:ln>
               <a:extLst>
                 <a:ext uri="{91240B29-F687-4f45-9708-019B960494DF}">
-                  <a14:hiddenLine xmlns:a14="http://schemas.microsoft.com/office/drawing/2010/main" xmlns="" w="9525">
+                  <a14:hiddenLine xmlns="" xmlns:a14="http://schemas.microsoft.com/office/drawing/2010/main" w="9525">
                     <a:solidFill>
                       <a:srgbClr val="000000"/>
                     </a:solidFill>
@@ -10060,7 +10065,7 @@
               </a:ln>
               <a:extLst>
                 <a:ext uri="{91240B29-F687-4f45-9708-019B960494DF}">
-                  <a14:hiddenLine xmlns:a14="http://schemas.microsoft.com/office/drawing/2010/main" xmlns="" w="9525">
+                  <a14:hiddenLine xmlns="" xmlns:a14="http://schemas.microsoft.com/office/drawing/2010/main" w="9525">
                     <a:solidFill>
                       <a:srgbClr val="000000"/>
                     </a:solidFill>
@@ -10150,7 +10155,7 @@
               </a:ln>
               <a:extLst>
                 <a:ext uri="{91240B29-F687-4f45-9708-019B960494DF}">
-                  <a14:hiddenLine xmlns:a14="http://schemas.microsoft.com/office/drawing/2010/main" xmlns="" w="9525">
+                  <a14:hiddenLine xmlns="" xmlns:a14="http://schemas.microsoft.com/office/drawing/2010/main" w="9525">
                     <a:solidFill>
                       <a:srgbClr val="000000"/>
                     </a:solidFill>
@@ -10184,7 +10189,7 @@
               </a:ln>
               <a:extLst>
                 <a:ext uri="{91240B29-F687-4f45-9708-019B960494DF}">
-                  <a14:hiddenLine xmlns:a14="http://schemas.microsoft.com/office/drawing/2010/main" xmlns="" w="9525">
+                  <a14:hiddenLine xmlns="" xmlns:a14="http://schemas.microsoft.com/office/drawing/2010/main" w="9525">
                     <a:solidFill>
                       <a:srgbClr val="000000"/>
                     </a:solidFill>
@@ -10249,7 +10254,7 @@
               </a:ln>
               <a:extLst>
                 <a:ext uri="{91240B29-F687-4f45-9708-019B960494DF}">
-                  <a14:hiddenLine xmlns:a14="http://schemas.microsoft.com/office/drawing/2010/main" xmlns="" w="9525">
+                  <a14:hiddenLine xmlns="" xmlns:a14="http://schemas.microsoft.com/office/drawing/2010/main" w="9525">
                     <a:solidFill>
                       <a:srgbClr val="000000"/>
                     </a:solidFill>
@@ -10339,7 +10344,7 @@
               </a:ln>
               <a:extLst>
                 <a:ext uri="{91240B29-F687-4f45-9708-019B960494DF}">
-                  <a14:hiddenLine xmlns:a14="http://schemas.microsoft.com/office/drawing/2010/main" xmlns="" w="9525">
+                  <a14:hiddenLine xmlns="" xmlns:a14="http://schemas.microsoft.com/office/drawing/2010/main" w="9525">
                     <a:solidFill>
                       <a:srgbClr val="000000"/>
                     </a:solidFill>
@@ -10401,7 +10406,7 @@
               </a:ln>
               <a:extLst>
                 <a:ext uri="{91240B29-F687-4f45-9708-019B960494DF}">
-                  <a14:hiddenLine xmlns:a14="http://schemas.microsoft.com/office/drawing/2010/main" xmlns="" w="9525">
+                  <a14:hiddenLine xmlns="" xmlns:a14="http://schemas.microsoft.com/office/drawing/2010/main" w="9525">
                     <a:solidFill>
                       <a:srgbClr val="000000"/>
                     </a:solidFill>
@@ -10491,7 +10496,7 @@
               </a:ln>
               <a:extLst>
                 <a:ext uri="{91240B29-F687-4f45-9708-019B960494DF}">
-                  <a14:hiddenLine xmlns:a14="http://schemas.microsoft.com/office/drawing/2010/main" xmlns="" w="9525">
+                  <a14:hiddenLine xmlns="" xmlns:a14="http://schemas.microsoft.com/office/drawing/2010/main" w="9525">
                     <a:solidFill>
                       <a:srgbClr val="000000"/>
                     </a:solidFill>
@@ -10556,7 +10561,7 @@
               </a:ln>
               <a:extLst>
                 <a:ext uri="{91240B29-F687-4f45-9708-019B960494DF}">
-                  <a14:hiddenLine xmlns:a14="http://schemas.microsoft.com/office/drawing/2010/main" xmlns="" w="9525">
+                  <a14:hiddenLine xmlns="" xmlns:a14="http://schemas.microsoft.com/office/drawing/2010/main" w="9525">
                     <a:solidFill>
                       <a:srgbClr val="000000"/>
                     </a:solidFill>
@@ -10618,7 +10623,7 @@
               </a:ln>
               <a:extLst>
                 <a:ext uri="{91240B29-F687-4f45-9708-019B960494DF}">
-                  <a14:hiddenLine xmlns:a14="http://schemas.microsoft.com/office/drawing/2010/main" xmlns="" w="9525">
+                  <a14:hiddenLine xmlns="" xmlns:a14="http://schemas.microsoft.com/office/drawing/2010/main" w="9525">
                     <a:solidFill>
                       <a:srgbClr val="000000"/>
                     </a:solidFill>
@@ -10708,7 +10713,7 @@
               </a:ln>
               <a:extLst>
                 <a:ext uri="{91240B29-F687-4f45-9708-019B960494DF}">
-                  <a14:hiddenLine xmlns:a14="http://schemas.microsoft.com/office/drawing/2010/main" xmlns="" w="9525">
+                  <a14:hiddenLine xmlns="" xmlns:a14="http://schemas.microsoft.com/office/drawing/2010/main" w="9525">
                     <a:solidFill>
                       <a:srgbClr val="000000"/>
                     </a:solidFill>
@@ -10798,7 +10803,7 @@
               </a:ln>
               <a:extLst>
                 <a:ext uri="{91240B29-F687-4f45-9708-019B960494DF}">
-                  <a14:hiddenLine xmlns:a14="http://schemas.microsoft.com/office/drawing/2010/main" xmlns="" w="9525">
+                  <a14:hiddenLine xmlns="" xmlns:a14="http://schemas.microsoft.com/office/drawing/2010/main" w="9525">
                     <a:solidFill>
                       <a:srgbClr val="000000"/>
                     </a:solidFill>
@@ -10863,7 +10868,7 @@
               </a:ln>
               <a:extLst>
                 <a:ext uri="{91240B29-F687-4f45-9708-019B960494DF}">
-                  <a14:hiddenLine xmlns:a14="http://schemas.microsoft.com/office/drawing/2010/main" xmlns="" w="9525">
+                  <a14:hiddenLine xmlns="" xmlns:a14="http://schemas.microsoft.com/office/drawing/2010/main" w="9525">
                     <a:solidFill>
                       <a:srgbClr val="000000"/>
                     </a:solidFill>
@@ -10983,7 +10988,7 @@
               </a:ln>
               <a:extLst>
                 <a:ext uri="{91240B29-F687-4f45-9708-019B960494DF}">
-                  <a14:hiddenLine xmlns:a14="http://schemas.microsoft.com/office/drawing/2010/main" xmlns="" w="9525">
+                  <a14:hiddenLine xmlns="" xmlns:a14="http://schemas.microsoft.com/office/drawing/2010/main" w="9525">
                     <a:solidFill>
                       <a:srgbClr val="000000"/>
                     </a:solidFill>
@@ -11081,7 +11086,7 @@
               </a:ln>
               <a:extLst>
                 <a:ext uri="{91240B29-F687-4f45-9708-019B960494DF}">
-                  <a14:hiddenLine xmlns:a14="http://schemas.microsoft.com/office/drawing/2010/main" xmlns="" w="9525">
+                  <a14:hiddenLine xmlns="" xmlns:a14="http://schemas.microsoft.com/office/drawing/2010/main" w="9525">
                     <a:solidFill>
                       <a:srgbClr val="000000"/>
                     </a:solidFill>
@@ -11196,7 +11201,7 @@
               </a:ln>
               <a:extLst>
                 <a:ext uri="{91240B29-F687-4f45-9708-019B960494DF}">
-                  <a14:hiddenLine xmlns:a14="http://schemas.microsoft.com/office/drawing/2010/main" xmlns="" w="9525">
+                  <a14:hiddenLine xmlns="" xmlns:a14="http://schemas.microsoft.com/office/drawing/2010/main" w="9525">
                     <a:solidFill>
                       <a:srgbClr val="000000"/>
                     </a:solidFill>
@@ -11286,7 +11291,7 @@
               </a:ln>
               <a:extLst>
                 <a:ext uri="{91240B29-F687-4f45-9708-019B960494DF}">
-                  <a14:hiddenLine xmlns:a14="http://schemas.microsoft.com/office/drawing/2010/main" xmlns="" w="9525">
+                  <a14:hiddenLine xmlns="" xmlns:a14="http://schemas.microsoft.com/office/drawing/2010/main" w="9525">
                     <a:solidFill>
                       <a:srgbClr val="000000"/>
                     </a:solidFill>
@@ -11351,7 +11356,7 @@
               </a:ln>
               <a:extLst>
                 <a:ext uri="{91240B29-F687-4f45-9708-019B960494DF}">
-                  <a14:hiddenLine xmlns:a14="http://schemas.microsoft.com/office/drawing/2010/main" xmlns="" w="9525">
+                  <a14:hiddenLine xmlns="" xmlns:a14="http://schemas.microsoft.com/office/drawing/2010/main" w="9525">
                     <a:solidFill>
                       <a:srgbClr val="000000"/>
                     </a:solidFill>
@@ -11441,7 +11446,7 @@
               </a:ln>
               <a:extLst>
                 <a:ext uri="{91240B29-F687-4f45-9708-019B960494DF}">
-                  <a14:hiddenLine xmlns:a14="http://schemas.microsoft.com/office/drawing/2010/main" xmlns="" w="9525">
+                  <a14:hiddenLine xmlns="" xmlns:a14="http://schemas.microsoft.com/office/drawing/2010/main" w="9525">
                     <a:solidFill>
                       <a:srgbClr val="000000"/>
                     </a:solidFill>
@@ -11509,7 +11514,7 @@
               </a:ln>
               <a:extLst>
                 <a:ext uri="{91240B29-F687-4f45-9708-019B960494DF}">
-                  <a14:hiddenLine xmlns:a14="http://schemas.microsoft.com/office/drawing/2010/main" xmlns="" w="9525">
+                  <a14:hiddenLine xmlns="" xmlns:a14="http://schemas.microsoft.com/office/drawing/2010/main" w="9525">
                     <a:solidFill>
                       <a:srgbClr val="000000"/>
                     </a:solidFill>
@@ -11599,7 +11604,7 @@
               </a:ln>
               <a:extLst>
                 <a:ext uri="{91240B29-F687-4f45-9708-019B960494DF}">
-                  <a14:hiddenLine xmlns:a14="http://schemas.microsoft.com/office/drawing/2010/main" xmlns="" w="9525">
+                  <a14:hiddenLine xmlns="" xmlns:a14="http://schemas.microsoft.com/office/drawing/2010/main" w="9525">
                     <a:solidFill>
                       <a:srgbClr val="000000"/>
                     </a:solidFill>
@@ -11667,7 +11672,7 @@
               </a:ln>
               <a:extLst>
                 <a:ext uri="{91240B29-F687-4f45-9708-019B960494DF}">
-                  <a14:hiddenLine xmlns:a14="http://schemas.microsoft.com/office/drawing/2010/main" xmlns="" w="9525">
+                  <a14:hiddenLine xmlns="" xmlns:a14="http://schemas.microsoft.com/office/drawing/2010/main" w="9525">
                     <a:solidFill>
                       <a:srgbClr val="000000"/>
                     </a:solidFill>
@@ -11757,7 +11762,7 @@
               </a:ln>
               <a:extLst>
                 <a:ext uri="{91240B29-F687-4f45-9708-019B960494DF}">
-                  <a14:hiddenLine xmlns:a14="http://schemas.microsoft.com/office/drawing/2010/main" xmlns="" w="9525">
+                  <a14:hiddenLine xmlns="" xmlns:a14="http://schemas.microsoft.com/office/drawing/2010/main" w="9525">
                     <a:solidFill>
                       <a:srgbClr val="000000"/>
                     </a:solidFill>
@@ -11791,7 +11796,7 @@
               </a:ln>
               <a:extLst>
                 <a:ext uri="{91240B29-F687-4f45-9708-019B960494DF}">
-                  <a14:hiddenLine xmlns:a14="http://schemas.microsoft.com/office/drawing/2010/main" xmlns="" w="9525">
+                  <a14:hiddenLine xmlns="" xmlns:a14="http://schemas.microsoft.com/office/drawing/2010/main" w="9525">
                     <a:solidFill>
                       <a:srgbClr val="000000"/>
                     </a:solidFill>
@@ -12578,6 +12583,88 @@
           </a:p>
         </p:txBody>
       </p:sp>
+      <p:sp>
+        <p:nvSpPr>
+          <p:cNvPr id="3" name="Action Button: Custom 2">
+            <a:hlinkClick r:id="rId3" action="ppaction://hlinksldjump" highlightClick="1"/>
+          </p:cNvPr>
+          <p:cNvSpPr/>
+          <p:nvPr/>
+        </p:nvSpPr>
+        <p:spPr>
+          <a:xfrm>
+            <a:off x="7505700" y="4559300"/>
+            <a:ext cx="711200" cy="571500"/>
+          </a:xfrm>
+          <a:prstGeom prst="actionButtonBlank">
+            <a:avLst/>
+          </a:prstGeom>
+          <a:noFill/>
+        </p:spPr>
+        <p:style>
+          <a:lnRef idx="2">
+            <a:schemeClr val="accent6"/>
+          </a:lnRef>
+          <a:fillRef idx="1">
+            <a:schemeClr val="lt1"/>
+          </a:fillRef>
+          <a:effectRef idx="0">
+            <a:schemeClr val="accent6"/>
+          </a:effectRef>
+          <a:fontRef idx="minor">
+            <a:schemeClr val="dk1"/>
+          </a:fontRef>
+        </p:style>
+        <p:txBody>
+          <a:bodyPr rtlCol="0" anchor="ctr"/>
+          <a:lstStyle/>
+          <a:p>
+            <a:pPr algn="ctr"/>
+            <a:endParaRPr lang="en-US"/>
+          </a:p>
+        </p:txBody>
+      </p:sp>
+      <p:sp>
+        <p:nvSpPr>
+          <p:cNvPr id="6" name="Action Button: Custom 5">
+            <a:hlinkClick r:id="rId4" action="ppaction://hlinksldjump" highlightClick="1"/>
+          </p:cNvPr>
+          <p:cNvSpPr/>
+          <p:nvPr/>
+        </p:nvSpPr>
+        <p:spPr>
+          <a:xfrm>
+            <a:off x="8216900" y="4559300"/>
+            <a:ext cx="786606" cy="571500"/>
+          </a:xfrm>
+          <a:prstGeom prst="actionButtonBlank">
+            <a:avLst/>
+          </a:prstGeom>
+          <a:noFill/>
+        </p:spPr>
+        <p:style>
+          <a:lnRef idx="2">
+            <a:schemeClr val="accent6"/>
+          </a:lnRef>
+          <a:fillRef idx="1">
+            <a:schemeClr val="lt1"/>
+          </a:fillRef>
+          <a:effectRef idx="0">
+            <a:schemeClr val="accent6"/>
+          </a:effectRef>
+          <a:fontRef idx="minor">
+            <a:schemeClr val="dk1"/>
+          </a:fontRef>
+        </p:style>
+        <p:txBody>
+          <a:bodyPr rtlCol="0" anchor="ctr"/>
+          <a:lstStyle/>
+          <a:p>
+            <a:pPr algn="ctr"/>
+            <a:endParaRPr lang="en-US"/>
+          </a:p>
+        </p:txBody>
+      </p:sp>
     </p:spTree>
     <p:extLst>
       <p:ext uri="{BB962C8B-B14F-4D97-AF65-F5344CB8AC3E}">
@@ -12715,6 +12802,129 @@
           </a:xfrm>
         </p:spPr>
       </p:pic>
+      <p:sp>
+        <p:nvSpPr>
+          <p:cNvPr id="3" name="Action Button: Custom 2">
+            <a:hlinkClick r:id="rId3" action="ppaction://hlinksldjump" highlightClick="1"/>
+          </p:cNvPr>
+          <p:cNvSpPr/>
+          <p:nvPr/>
+        </p:nvSpPr>
+        <p:spPr>
+          <a:xfrm>
+            <a:off x="7505700" y="1207069"/>
+            <a:ext cx="355600" cy="342331"/>
+          </a:xfrm>
+          <a:prstGeom prst="actionButtonBlank">
+            <a:avLst/>
+          </a:prstGeom>
+          <a:noFill/>
+        </p:spPr>
+        <p:style>
+          <a:lnRef idx="2">
+            <a:schemeClr val="accent6"/>
+          </a:lnRef>
+          <a:fillRef idx="1">
+            <a:schemeClr val="lt1"/>
+          </a:fillRef>
+          <a:effectRef idx="0">
+            <a:schemeClr val="accent6"/>
+          </a:effectRef>
+          <a:fontRef idx="minor">
+            <a:schemeClr val="dk1"/>
+          </a:fontRef>
+        </p:style>
+        <p:txBody>
+          <a:bodyPr rtlCol="0" anchor="ctr"/>
+          <a:lstStyle/>
+          <a:p>
+            <a:pPr algn="ctr"/>
+            <a:endParaRPr lang="en-US"/>
+          </a:p>
+        </p:txBody>
+      </p:sp>
+      <p:sp>
+        <p:nvSpPr>
+          <p:cNvPr id="6" name="Action Button: Custom 5">
+            <a:hlinkClick r:id="rId4" action="ppaction://hlinksldjump" highlightClick="1"/>
+          </p:cNvPr>
+          <p:cNvSpPr/>
+          <p:nvPr/>
+        </p:nvSpPr>
+        <p:spPr>
+          <a:xfrm>
+            <a:off x="7505700" y="4559300"/>
+            <a:ext cx="711200" cy="571500"/>
+          </a:xfrm>
+          <a:prstGeom prst="actionButtonBlank">
+            <a:avLst/>
+          </a:prstGeom>
+          <a:noFill/>
+        </p:spPr>
+        <p:style>
+          <a:lnRef idx="2">
+            <a:schemeClr val="accent6"/>
+          </a:lnRef>
+          <a:fillRef idx="1">
+            <a:schemeClr val="lt1"/>
+          </a:fillRef>
+          <a:effectRef idx="0">
+            <a:schemeClr val="accent6"/>
+          </a:effectRef>
+          <a:fontRef idx="minor">
+            <a:schemeClr val="dk1"/>
+          </a:fontRef>
+        </p:style>
+        <p:txBody>
+          <a:bodyPr rtlCol="0" anchor="ctr"/>
+          <a:lstStyle/>
+          <a:p>
+            <a:pPr algn="ctr"/>
+            <a:endParaRPr lang="en-US"/>
+          </a:p>
+        </p:txBody>
+      </p:sp>
+      <p:sp>
+        <p:nvSpPr>
+          <p:cNvPr id="7" name="Action Button: Custom 6">
+            <a:hlinkClick r:id="rId5" action="ppaction://hlinksldjump" highlightClick="1"/>
+          </p:cNvPr>
+          <p:cNvSpPr/>
+          <p:nvPr/>
+        </p:nvSpPr>
+        <p:spPr>
+          <a:xfrm>
+            <a:off x="8216900" y="4559300"/>
+            <a:ext cx="786606" cy="571500"/>
+          </a:xfrm>
+          <a:prstGeom prst="actionButtonBlank">
+            <a:avLst/>
+          </a:prstGeom>
+          <a:noFill/>
+        </p:spPr>
+        <p:style>
+          <a:lnRef idx="2">
+            <a:schemeClr val="accent6"/>
+          </a:lnRef>
+          <a:fillRef idx="1">
+            <a:schemeClr val="lt1"/>
+          </a:fillRef>
+          <a:effectRef idx="0">
+            <a:schemeClr val="accent6"/>
+          </a:effectRef>
+          <a:fontRef idx="minor">
+            <a:schemeClr val="dk1"/>
+          </a:fontRef>
+        </p:style>
+        <p:txBody>
+          <a:bodyPr rtlCol="0" anchor="ctr"/>
+          <a:lstStyle/>
+          <a:p>
+            <a:pPr algn="ctr"/>
+            <a:endParaRPr lang="en-US"/>
+          </a:p>
+        </p:txBody>
+      </p:sp>
     </p:spTree>
     <p:extLst>
       <p:ext uri="{BB962C8B-B14F-4D97-AF65-F5344CB8AC3E}">
@@ -12870,6 +13080,129 @@
           </a:xfrm>
         </p:spPr>
       </p:pic>
+      <p:sp>
+        <p:nvSpPr>
+          <p:cNvPr id="5" name="Action Button: Custom 4">
+            <a:hlinkClick r:id="rId3" action="ppaction://hlinksldjump" highlightClick="1"/>
+          </p:cNvPr>
+          <p:cNvSpPr/>
+          <p:nvPr/>
+        </p:nvSpPr>
+        <p:spPr>
+          <a:xfrm>
+            <a:off x="7505700" y="1207069"/>
+            <a:ext cx="355600" cy="342331"/>
+          </a:xfrm>
+          <a:prstGeom prst="actionButtonBlank">
+            <a:avLst/>
+          </a:prstGeom>
+          <a:noFill/>
+        </p:spPr>
+        <p:style>
+          <a:lnRef idx="2">
+            <a:schemeClr val="accent6"/>
+          </a:lnRef>
+          <a:fillRef idx="1">
+            <a:schemeClr val="lt1"/>
+          </a:fillRef>
+          <a:effectRef idx="0">
+            <a:schemeClr val="accent6"/>
+          </a:effectRef>
+          <a:fontRef idx="minor">
+            <a:schemeClr val="dk1"/>
+          </a:fontRef>
+        </p:style>
+        <p:txBody>
+          <a:bodyPr rtlCol="0" anchor="ctr"/>
+          <a:lstStyle/>
+          <a:p>
+            <a:pPr algn="ctr"/>
+            <a:endParaRPr lang="en-US"/>
+          </a:p>
+        </p:txBody>
+      </p:sp>
+      <p:sp>
+        <p:nvSpPr>
+          <p:cNvPr id="7" name="Action Button: Custom 6">
+            <a:hlinkClick r:id="rId4" action="ppaction://hlinksldjump" highlightClick="1"/>
+          </p:cNvPr>
+          <p:cNvSpPr/>
+          <p:nvPr/>
+        </p:nvSpPr>
+        <p:spPr>
+          <a:xfrm>
+            <a:off x="7505700" y="4559300"/>
+            <a:ext cx="711200" cy="571500"/>
+          </a:xfrm>
+          <a:prstGeom prst="actionButtonBlank">
+            <a:avLst/>
+          </a:prstGeom>
+          <a:noFill/>
+        </p:spPr>
+        <p:style>
+          <a:lnRef idx="2">
+            <a:schemeClr val="accent6"/>
+          </a:lnRef>
+          <a:fillRef idx="1">
+            <a:schemeClr val="lt1"/>
+          </a:fillRef>
+          <a:effectRef idx="0">
+            <a:schemeClr val="accent6"/>
+          </a:effectRef>
+          <a:fontRef idx="minor">
+            <a:schemeClr val="dk1"/>
+          </a:fontRef>
+        </p:style>
+        <p:txBody>
+          <a:bodyPr rtlCol="0" anchor="ctr"/>
+          <a:lstStyle/>
+          <a:p>
+            <a:pPr algn="ctr"/>
+            <a:endParaRPr lang="en-US"/>
+          </a:p>
+        </p:txBody>
+      </p:sp>
+      <p:sp>
+        <p:nvSpPr>
+          <p:cNvPr id="8" name="Action Button: Custom 7">
+            <a:hlinkClick r:id="rId5" action="ppaction://hlinksldjump" highlightClick="1"/>
+          </p:cNvPr>
+          <p:cNvSpPr/>
+          <p:nvPr/>
+        </p:nvSpPr>
+        <p:spPr>
+          <a:xfrm>
+            <a:off x="8216900" y="4559300"/>
+            <a:ext cx="786606" cy="571500"/>
+          </a:xfrm>
+          <a:prstGeom prst="actionButtonBlank">
+            <a:avLst/>
+          </a:prstGeom>
+          <a:noFill/>
+        </p:spPr>
+        <p:style>
+          <a:lnRef idx="2">
+            <a:schemeClr val="accent6"/>
+          </a:lnRef>
+          <a:fillRef idx="1">
+            <a:schemeClr val="lt1"/>
+          </a:fillRef>
+          <a:effectRef idx="0">
+            <a:schemeClr val="accent6"/>
+          </a:effectRef>
+          <a:fontRef idx="minor">
+            <a:schemeClr val="dk1"/>
+          </a:fontRef>
+        </p:style>
+        <p:txBody>
+          <a:bodyPr rtlCol="0" anchor="ctr"/>
+          <a:lstStyle/>
+          <a:p>
+            <a:pPr algn="ctr"/>
+            <a:endParaRPr lang="en-US"/>
+          </a:p>
+        </p:txBody>
+      </p:sp>
     </p:spTree>
     <p:extLst>
       <p:ext uri="{BB962C8B-B14F-4D97-AF65-F5344CB8AC3E}">
@@ -13039,6 +13372,170 @@
           </a:xfrm>
         </p:spPr>
       </p:pic>
+      <p:sp>
+        <p:nvSpPr>
+          <p:cNvPr id="6" name="Action Button: Custom 5">
+            <a:hlinkClick r:id="rId3" action="ppaction://hlinksldjump" highlightClick="1"/>
+          </p:cNvPr>
+          <p:cNvSpPr/>
+          <p:nvPr/>
+        </p:nvSpPr>
+        <p:spPr>
+          <a:xfrm>
+            <a:off x="7505700" y="1207069"/>
+            <a:ext cx="355600" cy="342331"/>
+          </a:xfrm>
+          <a:prstGeom prst="actionButtonBlank">
+            <a:avLst/>
+          </a:prstGeom>
+          <a:noFill/>
+        </p:spPr>
+        <p:style>
+          <a:lnRef idx="2">
+            <a:schemeClr val="accent6"/>
+          </a:lnRef>
+          <a:fillRef idx="1">
+            <a:schemeClr val="lt1"/>
+          </a:fillRef>
+          <a:effectRef idx="0">
+            <a:schemeClr val="accent6"/>
+          </a:effectRef>
+          <a:fontRef idx="minor">
+            <a:schemeClr val="dk1"/>
+          </a:fontRef>
+        </p:style>
+        <p:txBody>
+          <a:bodyPr rtlCol="0" anchor="ctr"/>
+          <a:lstStyle/>
+          <a:p>
+            <a:pPr algn="ctr"/>
+            <a:endParaRPr lang="en-US"/>
+          </a:p>
+        </p:txBody>
+      </p:sp>
+      <p:sp>
+        <p:nvSpPr>
+          <p:cNvPr id="7" name="Action Button: Custom 6">
+            <a:hlinkClick r:id="rId4" action="ppaction://hlinksldjump" highlightClick="1"/>
+          </p:cNvPr>
+          <p:cNvSpPr/>
+          <p:nvPr/>
+        </p:nvSpPr>
+        <p:spPr>
+          <a:xfrm>
+            <a:off x="7505700" y="4559300"/>
+            <a:ext cx="711200" cy="571500"/>
+          </a:xfrm>
+          <a:prstGeom prst="actionButtonBlank">
+            <a:avLst/>
+          </a:prstGeom>
+          <a:noFill/>
+        </p:spPr>
+        <p:style>
+          <a:lnRef idx="2">
+            <a:schemeClr val="accent6"/>
+          </a:lnRef>
+          <a:fillRef idx="1">
+            <a:schemeClr val="lt1"/>
+          </a:fillRef>
+          <a:effectRef idx="0">
+            <a:schemeClr val="accent6"/>
+          </a:effectRef>
+          <a:fontRef idx="minor">
+            <a:schemeClr val="dk1"/>
+          </a:fontRef>
+        </p:style>
+        <p:txBody>
+          <a:bodyPr rtlCol="0" anchor="ctr"/>
+          <a:lstStyle/>
+          <a:p>
+            <a:pPr algn="ctr"/>
+            <a:endParaRPr lang="en-US"/>
+          </a:p>
+        </p:txBody>
+      </p:sp>
+      <p:sp>
+        <p:nvSpPr>
+          <p:cNvPr id="8" name="Action Button: Custom 7">
+            <a:hlinkClick r:id="rId4" action="ppaction://hlinksldjump" highlightClick="1"/>
+          </p:cNvPr>
+          <p:cNvSpPr/>
+          <p:nvPr/>
+        </p:nvSpPr>
+        <p:spPr>
+          <a:xfrm>
+            <a:off x="8420100" y="3191669"/>
+            <a:ext cx="419100" cy="491331"/>
+          </a:xfrm>
+          <a:prstGeom prst="actionButtonBlank">
+            <a:avLst/>
+          </a:prstGeom>
+          <a:noFill/>
+        </p:spPr>
+        <p:style>
+          <a:lnRef idx="2">
+            <a:schemeClr val="accent6"/>
+          </a:lnRef>
+          <a:fillRef idx="1">
+            <a:schemeClr val="lt1"/>
+          </a:fillRef>
+          <a:effectRef idx="0">
+            <a:schemeClr val="accent6"/>
+          </a:effectRef>
+          <a:fontRef idx="minor">
+            <a:schemeClr val="dk1"/>
+          </a:fontRef>
+        </p:style>
+        <p:txBody>
+          <a:bodyPr rtlCol="0" anchor="ctr"/>
+          <a:lstStyle/>
+          <a:p>
+            <a:pPr algn="ctr"/>
+            <a:endParaRPr lang="en-US"/>
+          </a:p>
+        </p:txBody>
+      </p:sp>
+      <p:sp>
+        <p:nvSpPr>
+          <p:cNvPr id="9" name="Action Button: Custom 8">
+            <a:hlinkClick r:id="rId5" action="ppaction://hlinksldjump" highlightClick="1"/>
+          </p:cNvPr>
+          <p:cNvSpPr/>
+          <p:nvPr/>
+        </p:nvSpPr>
+        <p:spPr>
+          <a:xfrm>
+            <a:off x="8216900" y="4559300"/>
+            <a:ext cx="786606" cy="571500"/>
+          </a:xfrm>
+          <a:prstGeom prst="actionButtonBlank">
+            <a:avLst/>
+          </a:prstGeom>
+          <a:noFill/>
+        </p:spPr>
+        <p:style>
+          <a:lnRef idx="2">
+            <a:schemeClr val="accent6"/>
+          </a:lnRef>
+          <a:fillRef idx="1">
+            <a:schemeClr val="lt1"/>
+          </a:fillRef>
+          <a:effectRef idx="0">
+            <a:schemeClr val="accent6"/>
+          </a:effectRef>
+          <a:fontRef idx="minor">
+            <a:schemeClr val="dk1"/>
+          </a:fontRef>
+        </p:style>
+        <p:txBody>
+          <a:bodyPr rtlCol="0" anchor="ctr"/>
+          <a:lstStyle/>
+          <a:p>
+            <a:pPr algn="ctr"/>
+            <a:endParaRPr lang="en-US"/>
+          </a:p>
+        </p:txBody>
+      </p:sp>
     </p:spTree>
     <p:extLst>
       <p:ext uri="{BB962C8B-B14F-4D97-AF65-F5344CB8AC3E}">

</xml_diff>